<commit_message>
Updated Powerpoint and changed commenting in newUserimport
</commit_message>
<xml_diff>
--- a/ietaPowershell2018.pptx
+++ b/ietaPowershell2018.pptx
@@ -2997,7 +2997,7 @@
           <a:lstStyle/>
           <a:p>
             <a:r>
-              <a:rPr lang="en-US" b="1" dirty="0">
+              <a:rPr lang="en-US" dirty="0">
                 <a:solidFill>
                   <a:schemeClr val="bg1"/>
                 </a:solidFill>
@@ -3073,13 +3073,6 @@
   <p:clrMapOvr>
     <a:masterClrMapping/>
   </p:clrMapOvr>
-  <p:timing>
-    <p:tnLst>
-      <p:par>
-        <p:cTn id="1" dur="indefinite" restart="never" nodeType="tmRoot"/>
-      </p:par>
-    </p:tnLst>
-  </p:timing>
 </p:sld>
 </file>
 
@@ -3113,7 +3106,7 @@
           <p:cNvPr id="3" name="TextBox 2">
             <a:extLst>
               <a:ext uri="{FF2B5EF4-FFF2-40B4-BE49-F238E27FC236}">
-                <a16:creationId xmlns:a16="http://schemas.microsoft.com/office/drawing/2014/main" xmlns="" id="{B956B5AE-63A1-42B9-AD3D-3D7935ABA41F}"/>
+                <a16:creationId xmlns:a16="http://schemas.microsoft.com/office/drawing/2014/main" id="{B956B5AE-63A1-42B9-AD3D-3D7935ABA41F}"/>
               </a:ext>
             </a:extLst>
           </p:cNvPr>
@@ -3137,18 +3130,13 @@
           <a:lstStyle/>
           <a:p>
             <a:r>
-              <a:rPr lang="en-US" sz="5400" dirty="0" smtClean="0">
+              <a:rPr lang="en-US" sz="5400" dirty="0">
                 <a:solidFill>
                   <a:schemeClr val="bg1"/>
                 </a:solidFill>
               </a:rPr>
               <a:t>Objectives</a:t>
             </a:r>
-            <a:endParaRPr lang="en-US" sz="5400" dirty="0">
-              <a:solidFill>
-                <a:schemeClr val="bg1"/>
-              </a:solidFill>
-            </a:endParaRPr>
           </a:p>
         </p:txBody>
       </p:sp>
@@ -3157,7 +3145,7 @@
           <p:cNvPr id="4" name="TextBox 3">
             <a:extLst>
               <a:ext uri="{FF2B5EF4-FFF2-40B4-BE49-F238E27FC236}">
-                <a16:creationId xmlns:a16="http://schemas.microsoft.com/office/drawing/2014/main" xmlns="" id="{B956B5AE-63A1-42B9-AD3D-3D7935ABA41F}"/>
+                <a16:creationId xmlns:a16="http://schemas.microsoft.com/office/drawing/2014/main" id="{B956B5AE-63A1-42B9-AD3D-3D7935ABA41F}"/>
               </a:ext>
             </a:extLst>
           </p:cNvPr>
@@ -3181,7 +3169,7 @@
           <a:lstStyle/>
           <a:p>
             <a:r>
-              <a:rPr lang="en-US" sz="4800" b="1" dirty="0" smtClean="0">
+              <a:rPr lang="en-US" sz="4800" b="1" dirty="0">
                 <a:solidFill>
                   <a:schemeClr val="bg1"/>
                 </a:solidFill>
@@ -3191,38 +3179,17 @@
           </a:p>
           <a:p>
             <a:r>
-              <a:rPr lang="en-US" sz="4800" b="1" dirty="0" smtClean="0">
+              <a:rPr lang="en-US" sz="4800" b="1" dirty="0">
                 <a:solidFill>
                   <a:schemeClr val="bg1"/>
                 </a:solidFill>
               </a:rPr>
-              <a:t>- Share </a:t>
-            </a:r>
+              <a:t>- Share what I've learned</a:t>
+            </a:r>
+          </a:p>
+          <a:p>
             <a:r>
               <a:rPr lang="en-US" sz="4800" b="1" dirty="0">
-                <a:solidFill>
-                  <a:schemeClr val="bg1"/>
-                </a:solidFill>
-              </a:rPr>
-              <a:t>what I've </a:t>
-            </a:r>
-            <a:r>
-              <a:rPr lang="en-US" sz="4800" b="1" dirty="0" smtClean="0">
-                <a:solidFill>
-                  <a:schemeClr val="bg1"/>
-                </a:solidFill>
-              </a:rPr>
-              <a:t>learned</a:t>
-            </a:r>
-            <a:endParaRPr lang="en-US" sz="4800" b="1" dirty="0">
-              <a:solidFill>
-                <a:schemeClr val="bg1"/>
-              </a:solidFill>
-            </a:endParaRPr>
-          </a:p>
-          <a:p>
-            <a:r>
-              <a:rPr lang="en-US" sz="4800" b="1" dirty="0" smtClean="0">
                 <a:solidFill>
                   <a:schemeClr val="bg1"/>
                 </a:solidFill>
@@ -3232,18 +3199,13 @@
           </a:p>
           <a:p>
             <a:r>
-              <a:rPr lang="en-US" sz="4800" b="1" dirty="0" smtClean="0">
+              <a:rPr lang="en-US" sz="4800" b="1" dirty="0">
                 <a:solidFill>
                   <a:schemeClr val="bg1"/>
                 </a:solidFill>
               </a:rPr>
               <a:t>- Provide resources</a:t>
             </a:r>
-            <a:endParaRPr lang="en-US" sz="4800" b="1" dirty="0">
-              <a:solidFill>
-                <a:schemeClr val="bg1"/>
-              </a:solidFill>
-            </a:endParaRPr>
           </a:p>
         </p:txBody>
       </p:sp>
@@ -3257,13 +3219,6 @@
   <p:clrMapOvr>
     <a:masterClrMapping/>
   </p:clrMapOvr>
-  <p:timing>
-    <p:tnLst>
-      <p:par>
-        <p:cTn id="1" dur="indefinite" restart="never" nodeType="tmRoot"/>
-      </p:par>
-    </p:tnLst>
-  </p:timing>
 </p:sld>
 </file>
 
@@ -3297,7 +3252,7 @@
           <p:cNvPr id="3" name="TextBox 2">
             <a:extLst>
               <a:ext uri="{FF2B5EF4-FFF2-40B4-BE49-F238E27FC236}">
-                <a16:creationId xmlns:a16="http://schemas.microsoft.com/office/drawing/2014/main" xmlns="" id="{B956B5AE-63A1-42B9-AD3D-3D7935ABA41F}"/>
+                <a16:creationId xmlns:a16="http://schemas.microsoft.com/office/drawing/2014/main" id="{B956B5AE-63A1-42B9-AD3D-3D7935ABA41F}"/>
               </a:ext>
             </a:extLst>
           </p:cNvPr>
@@ -3322,18 +3277,13 @@
           <a:p>
             <a:pPr algn="ctr"/>
             <a:r>
-              <a:rPr lang="en-US" sz="5400" dirty="0" smtClean="0">
+              <a:rPr lang="en-US" sz="5400" dirty="0">
                 <a:solidFill>
                   <a:schemeClr val="bg1"/>
                 </a:solidFill>
               </a:rPr>
               <a:t>What is PowerShell?</a:t>
             </a:r>
-            <a:endParaRPr lang="en-US" sz="5400" dirty="0">
-              <a:solidFill>
-                <a:schemeClr val="bg1"/>
-              </a:solidFill>
-            </a:endParaRPr>
           </a:p>
         </p:txBody>
       </p:sp>
@@ -3347,13 +3297,6 @@
   <p:clrMapOvr>
     <a:masterClrMapping/>
   </p:clrMapOvr>
-  <p:timing>
-    <p:tnLst>
-      <p:par>
-        <p:cTn id="1" dur="indefinite" restart="never" nodeType="tmRoot"/>
-      </p:par>
-    </p:tnLst>
-  </p:timing>
 </p:sld>
 </file>
 
@@ -3416,13 +3359,6 @@
   <p:clrMapOvr>
     <a:masterClrMapping/>
   </p:clrMapOvr>
-  <p:timing>
-    <p:tnLst>
-      <p:par>
-        <p:cTn id="1" dur="indefinite" restart="never" nodeType="tmRoot"/>
-      </p:par>
-    </p:tnLst>
-  </p:timing>
 </p:sld>
 </file>
 
@@ -3485,13 +3421,6 @@
   <p:clrMapOvr>
     <a:masterClrMapping/>
   </p:clrMapOvr>
-  <p:timing>
-    <p:tnLst>
-      <p:par>
-        <p:cTn id="1" dur="indefinite" restart="never" nodeType="tmRoot"/>
-      </p:par>
-    </p:tnLst>
-  </p:timing>
 </p:sld>
 </file>
 
@@ -3554,13 +3483,6 @@
   <p:clrMapOvr>
     <a:masterClrMapping/>
   </p:clrMapOvr>
-  <p:timing>
-    <p:tnLst>
-      <p:par>
-        <p:cTn id="1" dur="indefinite" restart="never" nodeType="tmRoot"/>
-      </p:par>
-    </p:tnLst>
-  </p:timing>
 </p:sld>
 </file>
 
@@ -3647,13 +3569,6 @@
   <p:clrMapOvr>
     <a:masterClrMapping/>
   </p:clrMapOvr>
-  <p:timing>
-    <p:tnLst>
-      <p:par>
-        <p:cTn id="1" dur="indefinite" restart="never" nodeType="tmRoot"/>
-      </p:par>
-    </p:tnLst>
-  </p:timing>
 </p:sld>
 </file>
 
@@ -3735,7 +3650,7 @@
           <p:cNvPr id="4" name="TextBox 3">
             <a:extLst>
               <a:ext uri="{FF2B5EF4-FFF2-40B4-BE49-F238E27FC236}">
-                <a16:creationId xmlns:a16="http://schemas.microsoft.com/office/drawing/2014/main" xmlns="" id="{B956B5AE-63A1-42B9-AD3D-3D7935ABA41F}"/>
+                <a16:creationId xmlns:a16="http://schemas.microsoft.com/office/drawing/2014/main" id="{B956B5AE-63A1-42B9-AD3D-3D7935ABA41F}"/>
               </a:ext>
             </a:extLst>
           </p:cNvPr>
@@ -3760,18 +3675,13 @@
           <a:p>
             <a:pPr algn="ctr"/>
             <a:r>
-              <a:rPr lang="en-US" sz="5400" dirty="0" smtClean="0">
+              <a:rPr lang="en-US" sz="5400" dirty="0">
                 <a:solidFill>
                   <a:schemeClr val="bg1"/>
                 </a:solidFill>
               </a:rPr>
               <a:t>--&gt;</a:t>
             </a:r>
-            <a:endParaRPr lang="en-US" sz="5400" dirty="0">
-              <a:solidFill>
-                <a:schemeClr val="bg1"/>
-              </a:solidFill>
-            </a:endParaRPr>
           </a:p>
         </p:txBody>
       </p:sp>
@@ -3785,13 +3695,6 @@
   <p:clrMapOvr>
     <a:masterClrMapping/>
   </p:clrMapOvr>
-  <p:timing>
-    <p:tnLst>
-      <p:par>
-        <p:cTn id="1" dur="indefinite" restart="never" nodeType="tmRoot"/>
-      </p:par>
-    </p:tnLst>
-  </p:timing>
 </p:sld>
 </file>
 
@@ -3825,7 +3728,7 @@
           <p:cNvPr id="4" name="TextBox 3">
             <a:extLst>
               <a:ext uri="{FF2B5EF4-FFF2-40B4-BE49-F238E27FC236}">
-                <a16:creationId xmlns:a16="http://schemas.microsoft.com/office/drawing/2014/main" xmlns="" id="{B956B5AE-63A1-42B9-AD3D-3D7935ABA41F}"/>
+                <a16:creationId xmlns:a16="http://schemas.microsoft.com/office/drawing/2014/main" id="{B956B5AE-63A1-42B9-AD3D-3D7935ABA41F}"/>
               </a:ext>
             </a:extLst>
           </p:cNvPr>
@@ -3850,18 +3753,13 @@
           <a:p>
             <a:pPr algn="ctr"/>
             <a:r>
-              <a:rPr lang="en-US" sz="5400" dirty="0" smtClean="0">
+              <a:rPr lang="en-US" sz="5400" dirty="0">
                 <a:solidFill>
                   <a:schemeClr val="bg1"/>
                 </a:solidFill>
               </a:rPr>
               <a:t>--&gt;</a:t>
             </a:r>
-            <a:endParaRPr lang="en-US" sz="5400" dirty="0">
-              <a:solidFill>
-                <a:schemeClr val="bg1"/>
-              </a:solidFill>
-            </a:endParaRPr>
           </a:p>
         </p:txBody>
       </p:sp>
@@ -3957,13 +3855,6 @@
   <p:clrMapOvr>
     <a:masterClrMapping/>
   </p:clrMapOvr>
-  <p:timing>
-    <p:tnLst>
-      <p:par>
-        <p:cTn id="1" dur="indefinite" restart="never" nodeType="tmRoot"/>
-      </p:par>
-    </p:tnLst>
-  </p:timing>
 </p:sld>
 </file>
 
@@ -3997,7 +3888,7 @@
           <p:cNvPr id="3" name="TextBox 2">
             <a:extLst>
               <a:ext uri="{FF2B5EF4-FFF2-40B4-BE49-F238E27FC236}">
-                <a16:creationId xmlns:a16="http://schemas.microsoft.com/office/drawing/2014/main" xmlns="" id="{B956B5AE-63A1-42B9-AD3D-3D7935ABA41F}"/>
+                <a16:creationId xmlns:a16="http://schemas.microsoft.com/office/drawing/2014/main" id="{B956B5AE-63A1-42B9-AD3D-3D7935ABA41F}"/>
               </a:ext>
             </a:extLst>
           </p:cNvPr>
@@ -4022,7 +3913,7 @@
           <a:p>
             <a:pPr algn="ctr"/>
             <a:r>
-              <a:rPr lang="en-US" sz="5400" dirty="0" smtClean="0">
+              <a:rPr lang="en-US" sz="5400" dirty="0">
                 <a:solidFill>
                   <a:schemeClr val="bg1"/>
                 </a:solidFill>
@@ -4030,7 +3921,7 @@
               <a:t>$windows -ne $</a:t>
             </a:r>
             <a:r>
-              <a:rPr lang="en-US" sz="5400" dirty="0" err="1" smtClean="0">
+              <a:rPr lang="en-US" sz="5400" dirty="0" err="1">
                 <a:solidFill>
                   <a:schemeClr val="bg1"/>
                 </a:solidFill>
@@ -4055,13 +3946,6 @@
   <p:clrMapOvr>
     <a:masterClrMapping/>
   </p:clrMapOvr>
-  <p:timing>
-    <p:tnLst>
-      <p:par>
-        <p:cTn id="1" dur="indefinite" restart="never" nodeType="tmRoot"/>
-      </p:par>
-    </p:tnLst>
-  </p:timing>
 </p:sld>
 </file>
 
@@ -4125,7 +4009,7 @@
           <p:cNvPr id="3" name="TextBox 2">
             <a:extLst>
               <a:ext uri="{FF2B5EF4-FFF2-40B4-BE49-F238E27FC236}">
-                <a16:creationId xmlns:a16="http://schemas.microsoft.com/office/drawing/2014/main" xmlns="" id="{B956B5AE-63A1-42B9-AD3D-3D7935ABA41F}"/>
+                <a16:creationId xmlns:a16="http://schemas.microsoft.com/office/drawing/2014/main" id="{B956B5AE-63A1-42B9-AD3D-3D7935ABA41F}"/>
               </a:ext>
             </a:extLst>
           </p:cNvPr>
@@ -4149,7 +4033,7 @@
           <a:lstStyle/>
           <a:p>
             <a:r>
-              <a:rPr lang="en-US" sz="4800" dirty="0" smtClean="0">
+              <a:rPr lang="en-US" sz="4800" dirty="0">
                 <a:solidFill>
                   <a:schemeClr val="bg1"/>
                 </a:solidFill>
@@ -4157,14 +4041,14 @@
               <a:t>$</a:t>
             </a:r>
             <a:r>
-              <a:rPr lang="en-US" sz="4800" dirty="0" err="1" smtClean="0">
+              <a:rPr lang="en-US" sz="4800" dirty="0" err="1">
                 <a:solidFill>
                   <a:schemeClr val="bg1"/>
                 </a:solidFill>
               </a:rPr>
               <a:t>windowsPowershell</a:t>
             </a:r>
-            <a:endParaRPr lang="en-US" sz="4800" dirty="0" smtClean="0">
+            <a:endParaRPr lang="en-US" sz="4800" dirty="0">
               <a:solidFill>
                 <a:schemeClr val="bg1"/>
               </a:solidFill>
@@ -4172,7 +4056,7 @@
           </a:p>
           <a:p>
             <a:r>
-              <a:rPr lang="en-US" sz="4800" dirty="0" smtClean="0">
+              <a:rPr lang="en-US" sz="4800" dirty="0">
                 <a:solidFill>
                   <a:schemeClr val="bg1"/>
                 </a:solidFill>
@@ -4182,7 +4066,7 @@
           </a:p>
           <a:p>
             <a:r>
-              <a:rPr lang="en-US" sz="4800" dirty="0" smtClean="0">
+              <a:rPr lang="en-US" sz="4800" dirty="0">
                 <a:solidFill>
                   <a:schemeClr val="bg1"/>
                 </a:solidFill>
@@ -4190,7 +4074,7 @@
               <a:t>$</a:t>
             </a:r>
             <a:r>
-              <a:rPr lang="en-US" sz="4800" dirty="0" err="1" smtClean="0">
+              <a:rPr lang="en-US" sz="4800" dirty="0" err="1">
                 <a:solidFill>
                   <a:schemeClr val="bg1"/>
                 </a:solidFill>
@@ -4215,13 +4099,6 @@
   <p:clrMapOvr>
     <a:masterClrMapping/>
   </p:clrMapOvr>
-  <p:timing>
-    <p:tnLst>
-      <p:par>
-        <p:cTn id="1" dur="indefinite" restart="never" nodeType="tmRoot"/>
-      </p:par>
-    </p:tnLst>
-  </p:timing>
 </p:sld>
 </file>
 
@@ -4255,7 +4132,7 @@
           <p:cNvPr id="2" name="TextBox 1">
             <a:extLst>
               <a:ext uri="{FF2B5EF4-FFF2-40B4-BE49-F238E27FC236}">
-                <a16:creationId xmlns:a16="http://schemas.microsoft.com/office/drawing/2014/main" xmlns="" id="{CBD58CE3-DD28-4CD9-BE96-AD1D14A84DB6}"/>
+                <a16:creationId xmlns:a16="http://schemas.microsoft.com/office/drawing/2014/main" id="{CBD58CE3-DD28-4CD9-BE96-AD1D14A84DB6}"/>
               </a:ext>
             </a:extLst>
           </p:cNvPr>
@@ -4327,13 +4204,6 @@
   <p:clrMapOvr>
     <a:masterClrMapping/>
   </p:clrMapOvr>
-  <p:timing>
-    <p:tnLst>
-      <p:par>
-        <p:cTn id="1" dur="indefinite" restart="never" nodeType="tmRoot"/>
-      </p:par>
-    </p:tnLst>
-  </p:timing>
 </p:sld>
 </file>
 
@@ -4367,7 +4237,7 @@
           <p:cNvPr id="3" name="TextBox 2">
             <a:extLst>
               <a:ext uri="{FF2B5EF4-FFF2-40B4-BE49-F238E27FC236}">
-                <a16:creationId xmlns:a16="http://schemas.microsoft.com/office/drawing/2014/main" xmlns="" id="{B956B5AE-63A1-42B9-AD3D-3D7935ABA41F}"/>
+                <a16:creationId xmlns:a16="http://schemas.microsoft.com/office/drawing/2014/main" id="{B956B5AE-63A1-42B9-AD3D-3D7935ABA41F}"/>
               </a:ext>
             </a:extLst>
           </p:cNvPr>
@@ -4392,7 +4262,7 @@
           <a:p>
             <a:pPr algn="ctr"/>
             <a:r>
-              <a:rPr lang="en-US" sz="5400" dirty="0" smtClean="0">
+              <a:rPr lang="en-US" sz="5400" dirty="0">
                 <a:solidFill>
                   <a:schemeClr val="bg1"/>
                 </a:solidFill>
@@ -4621,13 +4491,6 @@
   <p:clrMapOvr>
     <a:masterClrMapping/>
   </p:clrMapOvr>
-  <p:timing>
-    <p:tnLst>
-      <p:par>
-        <p:cTn id="1" dur="indefinite" restart="never" nodeType="tmRoot"/>
-      </p:par>
-    </p:tnLst>
-  </p:timing>
 </p:sld>
 </file>
 
@@ -4661,7 +4524,7 @@
           <p:cNvPr id="2" name="TextBox 1">
             <a:extLst>
               <a:ext uri="{FF2B5EF4-FFF2-40B4-BE49-F238E27FC236}">
-                <a16:creationId xmlns:a16="http://schemas.microsoft.com/office/drawing/2014/main" xmlns="" id="{B956B5AE-63A1-42B9-AD3D-3D7935ABA41F}"/>
+                <a16:creationId xmlns:a16="http://schemas.microsoft.com/office/drawing/2014/main" id="{B956B5AE-63A1-42B9-AD3D-3D7935ABA41F}"/>
               </a:ext>
             </a:extLst>
           </p:cNvPr>
@@ -4670,8 +4533,8 @@
         </p:nvSpPr>
         <p:spPr>
           <a:xfrm>
-            <a:off x="144380" y="299335"/>
-            <a:ext cx="12192000" cy="1323439"/>
+            <a:off x="144380" y="257938"/>
+            <a:ext cx="12192000" cy="2554545"/>
           </a:xfrm>
           <a:prstGeom prst="rect">
             <a:avLst/>
@@ -4686,7 +4549,7 @@
           <a:p>
             <a:pPr algn="ctr"/>
             <a:r>
-              <a:rPr lang="en-US" sz="4000" dirty="0" smtClean="0">
+              <a:rPr lang="en-US" sz="4000" dirty="0">
                 <a:solidFill>
                   <a:schemeClr val="bg1"/>
                 </a:solidFill>
@@ -4694,20 +4557,34 @@
               <a:t>Contact Me</a:t>
             </a:r>
             <a:br>
-              <a:rPr lang="en-US" sz="4000" dirty="0" smtClean="0">
+              <a:rPr lang="en-US" sz="4000" dirty="0">
                 <a:solidFill>
                   <a:schemeClr val="bg1"/>
                 </a:solidFill>
               </a:rPr>
             </a:br>
             <a:r>
-              <a:rPr lang="en-US" sz="4000" dirty="0" smtClean="0">
+              <a:rPr lang="en-US" sz="4000" dirty="0">
                 <a:solidFill>
                   <a:schemeClr val="bg1"/>
                 </a:solidFill>
               </a:rPr>
               <a:t>(aka, shameless self-promotion)</a:t>
             </a:r>
+          </a:p>
+          <a:p>
+            <a:pPr algn="ctr"/>
+            <a:r>
+              <a:rPr lang="en-US" sz="4000" b="1" dirty="0">
+                <a:solidFill>
+                  <a:schemeClr val="bg1"/>
+                </a:solidFill>
+              </a:rPr>
+              <a:t>goo.gl/ooDVe5</a:t>
+            </a:r>
+          </a:p>
+          <a:p>
+            <a:pPr algn="ctr"/>
             <a:endParaRPr lang="en-US" sz="4000" dirty="0">
               <a:solidFill>
                 <a:schemeClr val="bg1"/>
@@ -4721,7 +4598,7 @@
           <p:cNvPr id="3" name="TextBox 2">
             <a:extLst>
               <a:ext uri="{FF2B5EF4-FFF2-40B4-BE49-F238E27FC236}">
-                <a16:creationId xmlns:a16="http://schemas.microsoft.com/office/drawing/2014/main" xmlns="" id="{B956B5AE-63A1-42B9-AD3D-3D7935ABA41F}"/>
+                <a16:creationId xmlns:a16="http://schemas.microsoft.com/office/drawing/2014/main" id="{B956B5AE-63A1-42B9-AD3D-3D7935ABA41F}"/>
               </a:ext>
             </a:extLst>
           </p:cNvPr>
@@ -4731,7 +4608,7 @@
         <p:spPr>
           <a:xfrm>
             <a:off x="144380" y="2032695"/>
-            <a:ext cx="5678904" cy="1754326"/>
+            <a:ext cx="5831118" cy="1754326"/>
           </a:xfrm>
           <a:prstGeom prst="rect">
             <a:avLst/>
@@ -4745,7 +4622,7 @@
           <a:lstStyle/>
           <a:p>
             <a:r>
-              <a:rPr lang="en-US" sz="5400" dirty="0" smtClean="0">
+              <a:rPr lang="en-US" sz="5400" dirty="0">
                 <a:solidFill>
                   <a:schemeClr val="bg1"/>
                 </a:solidFill>
@@ -4755,18 +4632,13 @@
           </a:p>
           <a:p>
             <a:r>
-              <a:rPr lang="en-US" sz="5400" b="1" dirty="0" smtClean="0">
+              <a:rPr lang="en-US" sz="5400" b="1" dirty="0">
                 <a:solidFill>
                   <a:schemeClr val="bg1"/>
                 </a:solidFill>
               </a:rPr>
-              <a:t>consenfactory.com</a:t>
-            </a:r>
-            <a:endParaRPr lang="en-US" sz="5400" b="1" dirty="0">
-              <a:solidFill>
-                <a:schemeClr val="bg1"/>
-              </a:solidFill>
-            </a:endParaRPr>
+              <a:t>consentfactory.com</a:t>
+            </a:r>
           </a:p>
         </p:txBody>
       </p:sp>
@@ -4816,7 +4688,7 @@
           <p:cNvPr id="5" name="TextBox 4">
             <a:extLst>
               <a:ext uri="{FF2B5EF4-FFF2-40B4-BE49-F238E27FC236}">
-                <a16:creationId xmlns:a16="http://schemas.microsoft.com/office/drawing/2014/main" xmlns="" id="{B956B5AE-63A1-42B9-AD3D-3D7935ABA41F}"/>
+                <a16:creationId xmlns:a16="http://schemas.microsoft.com/office/drawing/2014/main" id="{B956B5AE-63A1-42B9-AD3D-3D7935ABA41F}"/>
               </a:ext>
             </a:extLst>
           </p:cNvPr>
@@ -4841,7 +4713,7 @@
           <a:p>
             <a:pPr algn="r"/>
             <a:r>
-              <a:rPr lang="en-US" sz="5400" dirty="0" smtClean="0">
+              <a:rPr lang="en-US" sz="5400" dirty="0">
                 <a:solidFill>
                   <a:schemeClr val="bg1"/>
                 </a:solidFill>
@@ -4852,12 +4724,20 @@
           <a:p>
             <a:pPr algn="r"/>
             <a:r>
-              <a:rPr lang="en-US" sz="5400" b="1" dirty="0" smtClean="0">
+              <a:rPr lang="en-US" sz="5400" b="1" dirty="0">
                 <a:solidFill>
                   <a:schemeClr val="bg1"/>
                 </a:solidFill>
               </a:rPr>
-              <a:t>@consenfactory</a:t>
+              <a:t>@</a:t>
+            </a:r>
+            <a:r>
+              <a:rPr lang="en-US" sz="5400" b="1" dirty="0" err="1">
+                <a:solidFill>
+                  <a:schemeClr val="bg1"/>
+                </a:solidFill>
+              </a:rPr>
+              <a:t>consentfactory</a:t>
             </a:r>
             <a:endParaRPr lang="en-US" sz="5400" b="1" dirty="0">
               <a:solidFill>
@@ -4872,7 +4752,7 @@
           <p:cNvPr id="6" name="TextBox 5">
             <a:extLst>
               <a:ext uri="{FF2B5EF4-FFF2-40B4-BE49-F238E27FC236}">
-                <a16:creationId xmlns:a16="http://schemas.microsoft.com/office/drawing/2014/main" xmlns="" id="{B956B5AE-63A1-42B9-AD3D-3D7935ABA41F}"/>
+                <a16:creationId xmlns:a16="http://schemas.microsoft.com/office/drawing/2014/main" id="{B956B5AE-63A1-42B9-AD3D-3D7935ABA41F}"/>
               </a:ext>
             </a:extLst>
           </p:cNvPr>
@@ -4897,7 +4777,7 @@
           <a:p>
             <a:pPr algn="r"/>
             <a:r>
-              <a:rPr lang="en-US" sz="5400" dirty="0" smtClean="0">
+              <a:rPr lang="en-US" sz="5400" dirty="0">
                 <a:solidFill>
                   <a:schemeClr val="bg1"/>
                 </a:solidFill>
@@ -4913,14 +4793,14 @@
           <a:p>
             <a:pPr algn="r"/>
             <a:r>
-              <a:rPr lang="en-US" sz="5400" b="1" dirty="0" smtClean="0">
+              <a:rPr lang="en-US" sz="5400" b="1" dirty="0">
                 <a:solidFill>
                   <a:schemeClr val="bg1"/>
                 </a:solidFill>
               </a:rPr>
               <a:t>reddit.com/r/k12sysadmin</a:t>
             </a:r>
-            <a:endParaRPr lang="en-US" sz="5400" dirty="0" smtClean="0">
+            <a:endParaRPr lang="en-US" sz="5400" dirty="0">
               <a:solidFill>
                 <a:schemeClr val="bg1"/>
               </a:solidFill>
@@ -4938,13 +4818,6 @@
   <p:clrMapOvr>
     <a:masterClrMapping/>
   </p:clrMapOvr>
-  <p:timing>
-    <p:tnLst>
-      <p:par>
-        <p:cTn id="1" dur="indefinite" restart="never" nodeType="tmRoot"/>
-      </p:par>
-    </p:tnLst>
-  </p:timing>
 </p:sld>
 </file>
 
@@ -4978,7 +4851,7 @@
           <p:cNvPr id="2" name="TextBox 1">
             <a:extLst>
               <a:ext uri="{FF2B5EF4-FFF2-40B4-BE49-F238E27FC236}">
-                <a16:creationId xmlns:a16="http://schemas.microsoft.com/office/drawing/2014/main" xmlns="" id="{CBD58CE3-DD28-4CD9-BE96-AD1D14A84DB6}"/>
+                <a16:creationId xmlns:a16="http://schemas.microsoft.com/office/drawing/2014/main" id="{CBD58CE3-DD28-4CD9-BE96-AD1D14A84DB6}"/>
               </a:ext>
             </a:extLst>
           </p:cNvPr>
@@ -5023,13 +4896,6 @@
   <p:clrMapOvr>
     <a:masterClrMapping/>
   </p:clrMapOvr>
-  <p:timing>
-    <p:tnLst>
-      <p:par>
-        <p:cTn id="1" dur="indefinite" restart="never" nodeType="tmRoot"/>
-      </p:par>
-    </p:tnLst>
-  </p:timing>
 </p:sld>
 </file>
 
@@ -5063,7 +4929,7 @@
           <p:cNvPr id="2" name="TextBox 1">
             <a:extLst>
               <a:ext uri="{FF2B5EF4-FFF2-40B4-BE49-F238E27FC236}">
-                <a16:creationId xmlns:a16="http://schemas.microsoft.com/office/drawing/2014/main" xmlns="" id="{CBD58CE3-DD28-4CD9-BE96-AD1D14A84DB6}"/>
+                <a16:creationId xmlns:a16="http://schemas.microsoft.com/office/drawing/2014/main" id="{CBD58CE3-DD28-4CD9-BE96-AD1D14A84DB6}"/>
               </a:ext>
             </a:extLst>
           </p:cNvPr>
@@ -5112,7 +4978,7 @@
           <p:cNvPr id="4" name="Picture 3">
             <a:extLst>
               <a:ext uri="{FF2B5EF4-FFF2-40B4-BE49-F238E27FC236}">
-                <a16:creationId xmlns:a16="http://schemas.microsoft.com/office/drawing/2014/main" xmlns="" id="{BC31E4DB-54FF-4224-82F3-C803C4D5E95E}"/>
+                <a16:creationId xmlns:a16="http://schemas.microsoft.com/office/drawing/2014/main" id="{BC31E4DB-54FF-4224-82F3-C803C4D5E95E}"/>
               </a:ext>
             </a:extLst>
           </p:cNvPr>
@@ -5153,13 +5019,6 @@
   <p:clrMapOvr>
     <a:masterClrMapping/>
   </p:clrMapOvr>
-  <p:timing>
-    <p:tnLst>
-      <p:par>
-        <p:cTn id="1" dur="indefinite" restart="never" nodeType="tmRoot"/>
-      </p:par>
-    </p:tnLst>
-  </p:timing>
 </p:sld>
 </file>
 
@@ -5193,7 +5052,7 @@
           <p:cNvPr id="2" name="TextBox 1">
             <a:extLst>
               <a:ext uri="{FF2B5EF4-FFF2-40B4-BE49-F238E27FC236}">
-                <a16:creationId xmlns:a16="http://schemas.microsoft.com/office/drawing/2014/main" xmlns="" id="{CBD58CE3-DD28-4CD9-BE96-AD1D14A84DB6}"/>
+                <a16:creationId xmlns:a16="http://schemas.microsoft.com/office/drawing/2014/main" id="{CBD58CE3-DD28-4CD9-BE96-AD1D14A84DB6}"/>
               </a:ext>
             </a:extLst>
           </p:cNvPr>
@@ -5232,7 +5091,7 @@
           <p:cNvPr id="3" name="Rectangle 2">
             <a:extLst>
               <a:ext uri="{FF2B5EF4-FFF2-40B4-BE49-F238E27FC236}">
-                <a16:creationId xmlns:a16="http://schemas.microsoft.com/office/drawing/2014/main" xmlns="" id="{1F19E235-F522-4704-9E7B-5055FC3B438D}"/>
+                <a16:creationId xmlns:a16="http://schemas.microsoft.com/office/drawing/2014/main" id="{1F19E235-F522-4704-9E7B-5055FC3B438D}"/>
               </a:ext>
             </a:extLst>
           </p:cNvPr>
@@ -5287,13 +5146,6 @@
   <p:clrMapOvr>
     <a:masterClrMapping/>
   </p:clrMapOvr>
-  <p:timing>
-    <p:tnLst>
-      <p:par>
-        <p:cTn id="1" dur="indefinite" restart="never" nodeType="tmRoot"/>
-      </p:par>
-    </p:tnLst>
-  </p:timing>
 </p:sld>
 </file>
 
@@ -5327,7 +5179,7 @@
           <p:cNvPr id="2" name="TextBox 1">
             <a:extLst>
               <a:ext uri="{FF2B5EF4-FFF2-40B4-BE49-F238E27FC236}">
-                <a16:creationId xmlns:a16="http://schemas.microsoft.com/office/drawing/2014/main" xmlns="" id="{CBD58CE3-DD28-4CD9-BE96-AD1D14A84DB6}"/>
+                <a16:creationId xmlns:a16="http://schemas.microsoft.com/office/drawing/2014/main" id="{CBD58CE3-DD28-4CD9-BE96-AD1D14A84DB6}"/>
               </a:ext>
             </a:extLst>
           </p:cNvPr>
@@ -5379,13 +5231,6 @@
   <p:clrMapOvr>
     <a:masterClrMapping/>
   </p:clrMapOvr>
-  <p:timing>
-    <p:tnLst>
-      <p:par>
-        <p:cTn id="1" dur="indefinite" restart="never" nodeType="tmRoot"/>
-      </p:par>
-    </p:tnLst>
-  </p:timing>
 </p:sld>
 </file>
 
@@ -5419,7 +5264,7 @@
           <p:cNvPr id="2" name="TextBox 1">
             <a:extLst>
               <a:ext uri="{FF2B5EF4-FFF2-40B4-BE49-F238E27FC236}">
-                <a16:creationId xmlns:a16="http://schemas.microsoft.com/office/drawing/2014/main" xmlns="" id="{CBD58CE3-DD28-4CD9-BE96-AD1D14A84DB6}"/>
+                <a16:creationId xmlns:a16="http://schemas.microsoft.com/office/drawing/2014/main" id="{CBD58CE3-DD28-4CD9-BE96-AD1D14A84DB6}"/>
               </a:ext>
             </a:extLst>
           </p:cNvPr>
@@ -5456,23 +5301,7 @@
                   <a:schemeClr val="bg1"/>
                 </a:solidFill>
               </a:rPr>
-              <a:t> </a:t>
-            </a:r>
-            <a:r>
-              <a:rPr lang="en-US" sz="4400" dirty="0" smtClean="0">
-                <a:solidFill>
-                  <a:schemeClr val="bg1"/>
-                </a:solidFill>
-              </a:rPr>
-              <a:t>intermediate </a:t>
-            </a:r>
-            <a:r>
-              <a:rPr lang="en-US" sz="4400" dirty="0">
-                <a:solidFill>
-                  <a:schemeClr val="bg1"/>
-                </a:solidFill>
-              </a:rPr>
-              <a:t>session to PowerShell…</a:t>
+              <a:t> intermediate session to PowerShell…</a:t>
             </a:r>
           </a:p>
         </p:txBody>
@@ -5487,13 +5316,6 @@
   <p:clrMapOvr>
     <a:masterClrMapping/>
   </p:clrMapOvr>
-  <p:timing>
-    <p:tnLst>
-      <p:par>
-        <p:cTn id="1" dur="indefinite" restart="never" nodeType="tmRoot"/>
-      </p:par>
-    </p:tnLst>
-  </p:timing>
 </p:sld>
 </file>
 
@@ -5527,7 +5349,7 @@
           <p:cNvPr id="2" name="TextBox 1">
             <a:extLst>
               <a:ext uri="{FF2B5EF4-FFF2-40B4-BE49-F238E27FC236}">
-                <a16:creationId xmlns:a16="http://schemas.microsoft.com/office/drawing/2014/main" xmlns="" id="{CBD58CE3-DD28-4CD9-BE96-AD1D14A84DB6}"/>
+                <a16:creationId xmlns:a16="http://schemas.microsoft.com/office/drawing/2014/main" id="{CBD58CE3-DD28-4CD9-BE96-AD1D14A84DB6}"/>
               </a:ext>
             </a:extLst>
           </p:cNvPr>
@@ -5572,13 +5394,6 @@
   <p:clrMapOvr>
     <a:masterClrMapping/>
   </p:clrMapOvr>
-  <p:timing>
-    <p:tnLst>
-      <p:par>
-        <p:cTn id="1" dur="indefinite" restart="never" nodeType="tmRoot"/>
-      </p:par>
-    </p:tnLst>
-  </p:timing>
 </p:sld>
 </file>
 
@@ -5612,7 +5427,7 @@
           <p:cNvPr id="3" name="TextBox 2">
             <a:extLst>
               <a:ext uri="{FF2B5EF4-FFF2-40B4-BE49-F238E27FC236}">
-                <a16:creationId xmlns:a16="http://schemas.microsoft.com/office/drawing/2014/main" xmlns="" id="{B956B5AE-63A1-42B9-AD3D-3D7935ABA41F}"/>
+                <a16:creationId xmlns:a16="http://schemas.microsoft.com/office/drawing/2014/main" id="{B956B5AE-63A1-42B9-AD3D-3D7935ABA41F}"/>
               </a:ext>
             </a:extLst>
           </p:cNvPr>
@@ -5657,13 +5472,6 @@
   <p:clrMapOvr>
     <a:masterClrMapping/>
   </p:clrMapOvr>
-  <p:timing>
-    <p:tnLst>
-      <p:par>
-        <p:cTn id="1" dur="indefinite" restart="never" nodeType="tmRoot"/>
-      </p:par>
-    </p:tnLst>
-  </p:timing>
 </p:sld>
 </file>
 

</xml_diff>